<commit_message>
Modified lecture notes on AVA and OVA
</commit_message>
<xml_diff>
--- a/Lectures/Lecture 08_Beyond Binary Classification.pptx
+++ b/Lectures/Lecture 08_Beyond Binary Classification.pptx
@@ -509,7 +509,7 @@
           <a:p>
             <a:fld id="{AD8F4041-A7F6-7E43-8A7F-B321E8650533}" type="datetimeFigureOut">
               <a:rPr lang="en-US" smtClean="0"/>
-              <a:t>9/27/23</a:t>
+              <a:t>9/30/23</a:t>
             </a:fld>
             <a:endParaRPr lang="en-US"/>
           </a:p>
@@ -674,7 +674,7 @@
           <a:p>
             <a:fld id="{3FE918EF-26F2-F641-9B39-65E2E78847ED}" type="datetimeFigureOut">
               <a:rPr lang="en-US" smtClean="0"/>
-              <a:t>9/27/23</a:t>
+              <a:t>9/30/23</a:t>
             </a:fld>
             <a:endParaRPr lang="en-US"/>
           </a:p>
@@ -1378,7 +1378,7 @@
           <a:ln/>
           <a:extLst>
             <a:ext uri="{FAA26D3D-D897-4be2-8F04-BA451C77F1D7}">
-              <ma14:placeholderFlag xmlns="" xmlns:ma14="http://schemas.microsoft.com/office/mac/drawingml/2011/main" val="1"/>
+              <ma14:placeholderFlag xmlns:ma14="http://schemas.microsoft.com/office/mac/drawingml/2011/main" xmlns="" val="1"/>
             </a:ext>
           </a:extLst>
         </p:spPr>
@@ -1467,7 +1467,7 @@
           <a:ln/>
           <a:extLst>
             <a:ext uri="{FAA26D3D-D897-4be2-8F04-BA451C77F1D7}">
-              <ma14:placeholderFlag xmlns="" xmlns:ma14="http://schemas.microsoft.com/office/mac/drawingml/2011/main" val="1"/>
+              <ma14:placeholderFlag xmlns:ma14="http://schemas.microsoft.com/office/mac/drawingml/2011/main" xmlns="" val="1"/>
             </a:ext>
           </a:extLst>
         </p:spPr>
@@ -2059,7 +2059,7 @@
             <a:fld id="{23A271A1-F6D6-438B-A432-4747EE7ECD40}" type="datetimeFigureOut">
               <a:rPr lang="en-US" smtClean="0"/>
               <a:pPr algn="ctr" eaLnBrk="1" latinLnBrk="0" hangingPunct="1"/>
-              <a:t>9/27/23</a:t>
+              <a:t>9/30/23</a:t>
             </a:fld>
             <a:endParaRPr lang="en-US" sz="2000" dirty="0">
               <a:solidFill>
@@ -2265,7 +2265,7 @@
             <a:fld id="{23A271A1-F6D6-438B-A432-4747EE7ECD40}" type="datetimeFigureOut">
               <a:rPr lang="en-US" smtClean="0"/>
               <a:pPr eaLnBrk="1" latinLnBrk="0" hangingPunct="1"/>
-              <a:t>9/27/23</a:t>
+              <a:t>9/30/23</a:t>
             </a:fld>
             <a:endParaRPr lang="en-US"/>
           </a:p>
@@ -2452,7 +2452,7 @@
             <a:fld id="{23A271A1-F6D6-438B-A432-4747EE7ECD40}" type="datetimeFigureOut">
               <a:rPr lang="en-US" smtClean="0"/>
               <a:pPr eaLnBrk="1" latinLnBrk="0" hangingPunct="1"/>
-              <a:t>9/27/23</a:t>
+              <a:t>9/30/23</a:t>
             </a:fld>
             <a:endParaRPr lang="en-US" dirty="0"/>
           </a:p>
@@ -2717,7 +2717,7 @@
             <a:fld id="{23A271A1-F6D6-438B-A432-4747EE7ECD40}" type="datetimeFigureOut">
               <a:rPr lang="en-US" smtClean="0"/>
               <a:pPr eaLnBrk="1" latinLnBrk="0" hangingPunct="1"/>
-              <a:t>9/27/23</a:t>
+              <a:t>9/30/23</a:t>
             </a:fld>
             <a:endParaRPr lang="en-US" dirty="0"/>
           </a:p>
@@ -3139,7 +3139,7 @@
             <a:fld id="{23A271A1-F6D6-438B-A432-4747EE7ECD40}" type="datetimeFigureOut">
               <a:rPr lang="en-US" smtClean="0"/>
               <a:pPr eaLnBrk="1" latinLnBrk="0" hangingPunct="1"/>
-              <a:t>9/27/23</a:t>
+              <a:t>9/30/23</a:t>
             </a:fld>
             <a:endParaRPr lang="en-US"/>
           </a:p>
@@ -3388,7 +3388,7 @@
             <a:fld id="{23A271A1-F6D6-438B-A432-4747EE7ECD40}" type="datetimeFigureOut">
               <a:rPr lang="en-US" smtClean="0"/>
               <a:pPr eaLnBrk="1" latinLnBrk="0" hangingPunct="1"/>
-              <a:t>9/27/23</a:t>
+              <a:t>9/30/23</a:t>
             </a:fld>
             <a:endParaRPr lang="en-US"/>
           </a:p>
@@ -3627,7 +3627,7 @@
             <a:fld id="{23A271A1-F6D6-438B-A432-4747EE7ECD40}" type="datetimeFigureOut">
               <a:rPr lang="en-US" smtClean="0"/>
               <a:pPr eaLnBrk="1" latinLnBrk="0" hangingPunct="1"/>
-              <a:t>9/27/23</a:t>
+              <a:t>9/30/23</a:t>
             </a:fld>
             <a:endParaRPr lang="en-US"/>
           </a:p>
@@ -3825,7 +3825,7 @@
             <a:fld id="{23A271A1-F6D6-438B-A432-4747EE7ECD40}" type="datetimeFigureOut">
               <a:rPr lang="en-US" smtClean="0"/>
               <a:pPr eaLnBrk="1" latinLnBrk="0" hangingPunct="1"/>
-              <a:t>9/27/23</a:t>
+              <a:t>9/30/23</a:t>
             </a:fld>
             <a:endParaRPr lang="en-US"/>
           </a:p>
@@ -3930,7 +3930,7 @@
             <a:fld id="{23A271A1-F6D6-438B-A432-4747EE7ECD40}" type="datetimeFigureOut">
               <a:rPr lang="en-US" smtClean="0"/>
               <a:pPr eaLnBrk="1" latinLnBrk="0" hangingPunct="1"/>
-              <a:t>9/27/23</a:t>
+              <a:t>9/30/23</a:t>
             </a:fld>
             <a:endParaRPr lang="en-US"/>
           </a:p>
@@ -4072,7 +4072,7 @@
             <a:fld id="{23A271A1-F6D6-438B-A432-4747EE7ECD40}" type="datetimeFigureOut">
               <a:rPr lang="en-US" smtClean="0"/>
               <a:pPr eaLnBrk="1" latinLnBrk="0" hangingPunct="1"/>
-              <a:t>9/27/23</a:t>
+              <a:t>9/30/23</a:t>
             </a:fld>
             <a:endParaRPr lang="en-US"/>
           </a:p>
@@ -4596,7 +4596,7 @@
             <a:fld id="{23A271A1-F6D6-438B-A432-4747EE7ECD40}" type="datetimeFigureOut">
               <a:rPr lang="en-US" smtClean="0"/>
               <a:pPr eaLnBrk="1" latinLnBrk="0" hangingPunct="1"/>
-              <a:t>9/27/23</a:t>
+              <a:t>9/30/23</a:t>
             </a:fld>
             <a:endParaRPr lang="en-US"/>
           </a:p>
@@ -4859,7 +4859,7 @@
             <a:fld id="{23A271A1-F6D6-438B-A432-4747EE7ECD40}" type="datetimeFigureOut">
               <a:rPr lang="en-US" smtClean="0"/>
               <a:pPr eaLnBrk="1" latinLnBrk="0" hangingPunct="1"/>
-              <a:t>9/27/23</a:t>
+              <a:t>9/30/23</a:t>
             </a:fld>
             <a:endParaRPr lang="en-US" sz="1400" dirty="0">
               <a:solidFill>
@@ -22185,14 +22185,14 @@
             </a:ln>
             <a:extLst>
               <a:ext uri="{909E8E84-426E-40dd-AFC4-6F175D3DCCD1}">
-                <a14:hiddenFill xmlns="" xmlns:a14="http://schemas.microsoft.com/office/drawing/2010/main">
+                <a14:hiddenFill xmlns:a14="http://schemas.microsoft.com/office/drawing/2010/main" xmlns="">
                   <a:solidFill>
                     <a:srgbClr val="FFFFFF"/>
                   </a:solidFill>
                 </a14:hiddenFill>
               </a:ext>
               <a:ext uri="{91240B29-F687-4f45-9708-019B960494DF}">
-                <a14:hiddenLine xmlns="" xmlns:a14="http://schemas.microsoft.com/office/drawing/2010/main" w="9525">
+                <a14:hiddenLine xmlns:a14="http://schemas.microsoft.com/office/drawing/2010/main" xmlns="" w="9525">
                   <a:solidFill>
                     <a:srgbClr val="000000"/>
                   </a:solidFill>
@@ -22239,14 +22239,14 @@
             </a:ln>
             <a:extLst>
               <a:ext uri="{909E8E84-426E-40dd-AFC4-6F175D3DCCD1}">
-                <a14:hiddenFill xmlns="" xmlns:a14="http://schemas.microsoft.com/office/drawing/2010/main">
+                <a14:hiddenFill xmlns:a14="http://schemas.microsoft.com/office/drawing/2010/main" xmlns="">
                   <a:solidFill>
                     <a:srgbClr val="FFFFFF"/>
                   </a:solidFill>
                 </a14:hiddenFill>
               </a:ext>
               <a:ext uri="{91240B29-F687-4f45-9708-019B960494DF}">
-                <a14:hiddenLine xmlns="" xmlns:a14="http://schemas.microsoft.com/office/drawing/2010/main" w="9525">
+                <a14:hiddenLine xmlns:a14="http://schemas.microsoft.com/office/drawing/2010/main" xmlns="" w="9525">
                   <a:solidFill>
                     <a:srgbClr val="000000"/>
                   </a:solidFill>
@@ -22293,14 +22293,14 @@
             </a:ln>
             <a:extLst>
               <a:ext uri="{909E8E84-426E-40dd-AFC4-6F175D3DCCD1}">
-                <a14:hiddenFill xmlns="" xmlns:a14="http://schemas.microsoft.com/office/drawing/2010/main">
+                <a14:hiddenFill xmlns:a14="http://schemas.microsoft.com/office/drawing/2010/main" xmlns="">
                   <a:solidFill>
                     <a:srgbClr val="FFFFFF"/>
                   </a:solidFill>
                 </a14:hiddenFill>
               </a:ext>
               <a:ext uri="{91240B29-F687-4f45-9708-019B960494DF}">
-                <a14:hiddenLine xmlns="" xmlns:a14="http://schemas.microsoft.com/office/drawing/2010/main" w="9525">
+                <a14:hiddenLine xmlns:a14="http://schemas.microsoft.com/office/drawing/2010/main" xmlns="" w="9525">
                   <a:solidFill>
                     <a:srgbClr val="000000"/>
                   </a:solidFill>
@@ -22347,14 +22347,14 @@
             </a:ln>
             <a:extLst>
               <a:ext uri="{909E8E84-426E-40dd-AFC4-6F175D3DCCD1}">
-                <a14:hiddenFill xmlns="" xmlns:a14="http://schemas.microsoft.com/office/drawing/2010/main">
+                <a14:hiddenFill xmlns:a14="http://schemas.microsoft.com/office/drawing/2010/main" xmlns="">
                   <a:solidFill>
                     <a:srgbClr val="FFFFFF"/>
                   </a:solidFill>
                 </a14:hiddenFill>
               </a:ext>
               <a:ext uri="{91240B29-F687-4f45-9708-019B960494DF}">
-                <a14:hiddenLine xmlns="" xmlns:a14="http://schemas.microsoft.com/office/drawing/2010/main" w="9525">
+                <a14:hiddenLine xmlns:a14="http://schemas.microsoft.com/office/drawing/2010/main" xmlns="" w="9525">
                   <a:solidFill>
                     <a:srgbClr val="000000"/>
                   </a:solidFill>
@@ -22401,14 +22401,14 @@
             </a:ln>
             <a:extLst>
               <a:ext uri="{909E8E84-426E-40dd-AFC4-6F175D3DCCD1}">
-                <a14:hiddenFill xmlns="" xmlns:a14="http://schemas.microsoft.com/office/drawing/2010/main">
+                <a14:hiddenFill xmlns:a14="http://schemas.microsoft.com/office/drawing/2010/main" xmlns="">
                   <a:solidFill>
                     <a:srgbClr val="FFFFFF"/>
                   </a:solidFill>
                 </a14:hiddenFill>
               </a:ext>
               <a:ext uri="{91240B29-F687-4f45-9708-019B960494DF}">
-                <a14:hiddenLine xmlns="" xmlns:a14="http://schemas.microsoft.com/office/drawing/2010/main" w="9525">
+                <a14:hiddenLine xmlns:a14="http://schemas.microsoft.com/office/drawing/2010/main" xmlns="" w="9525">
                   <a:solidFill>
                     <a:srgbClr val="000000"/>
                   </a:solidFill>
@@ -22726,7 +22726,7 @@
           <a:noFill/>
           <a:extLst>
             <a:ext uri="{909E8E84-426E-40dd-AFC4-6F175D3DCCD1}">
-              <a14:hiddenFill xmlns="" xmlns:a14="http://schemas.microsoft.com/office/drawing/2010/main">
+              <a14:hiddenFill xmlns:a14="http://schemas.microsoft.com/office/drawing/2010/main" xmlns="">
                 <a:solidFill>
                   <a:srgbClr val="FFFFFF"/>
                 </a:solidFill>
@@ -27238,14 +27238,14 @@
           </a:ln>
           <a:extLst>
             <a:ext uri="{909E8E84-426E-40dd-AFC4-6F175D3DCCD1}">
-              <a14:hiddenFill xmlns="" xmlns:a14="http://schemas.microsoft.com/office/drawing/2010/main">
+              <a14:hiddenFill xmlns:a14="http://schemas.microsoft.com/office/drawing/2010/main" xmlns="">
                 <a:solidFill>
                   <a:srgbClr val="FFFFFF"/>
                 </a:solidFill>
               </a14:hiddenFill>
             </a:ext>
             <a:ext uri="{91240B29-F687-4f45-9708-019B960494DF}">
-              <a14:hiddenLine xmlns="" xmlns:a14="http://schemas.microsoft.com/office/drawing/2010/main" w="9525">
+              <a14:hiddenLine xmlns:a14="http://schemas.microsoft.com/office/drawing/2010/main" xmlns="" w="9525">
                 <a:solidFill>
                   <a:srgbClr val="000000"/>
                 </a:solidFill>
@@ -27383,14 +27383,14 @@
           <a:effectLst/>
           <a:extLst>
             <a:ext uri="{909E8E84-426E-40dd-AFC4-6F175D3DCCD1}">
-              <a14:hiddenFill xmlns="" xmlns:a14="http://schemas.microsoft.com/office/drawing/2010/main">
+              <a14:hiddenFill xmlns:a14="http://schemas.microsoft.com/office/drawing/2010/main" xmlns="">
                 <a:solidFill>
                   <a:schemeClr val="accent1"/>
                 </a:solidFill>
               </a14:hiddenFill>
             </a:ext>
             <a:ext uri="{91240B29-F687-4f45-9708-019B960494DF}">
-              <a14:hiddenLine xmlns="" xmlns:a14="http://schemas.microsoft.com/office/drawing/2010/main" w="9525">
+              <a14:hiddenLine xmlns:a14="http://schemas.microsoft.com/office/drawing/2010/main" xmlns="" w="9525">
                 <a:solidFill>
                   <a:schemeClr val="tx1"/>
                 </a:solidFill>
@@ -27400,7 +27400,7 @@
               </a14:hiddenLine>
             </a:ext>
             <a:ext uri="{AF507438-7753-43e0-B8FC-AC1667EBCBE1}">
-              <a14:hiddenEffects xmlns="" xmlns:a14="http://schemas.microsoft.com/office/drawing/2010/main">
+              <a14:hiddenEffects xmlns:a14="http://schemas.microsoft.com/office/drawing/2010/main" xmlns="">
                 <a:effectLst>
                   <a:outerShdw blurRad="63500" dist="38099" dir="2700000" algn="ctr" rotWithShape="0">
                     <a:schemeClr val="bg2">
@@ -27495,14 +27495,14 @@
           <a:effectLst/>
           <a:extLst>
             <a:ext uri="{909E8E84-426E-40dd-AFC4-6F175D3DCCD1}">
-              <a14:hiddenFill xmlns="" xmlns:a14="http://schemas.microsoft.com/office/drawing/2010/main">
+              <a14:hiddenFill xmlns:a14="http://schemas.microsoft.com/office/drawing/2010/main" xmlns="">
                 <a:solidFill>
                   <a:schemeClr val="accent1"/>
                 </a:solidFill>
               </a14:hiddenFill>
             </a:ext>
             <a:ext uri="{91240B29-F687-4f45-9708-019B960494DF}">
-              <a14:hiddenLine xmlns="" xmlns:a14="http://schemas.microsoft.com/office/drawing/2010/main" w="9525">
+              <a14:hiddenLine xmlns:a14="http://schemas.microsoft.com/office/drawing/2010/main" xmlns="" w="9525">
                 <a:solidFill>
                   <a:schemeClr val="tx1"/>
                 </a:solidFill>
@@ -27512,7 +27512,7 @@
               </a14:hiddenLine>
             </a:ext>
             <a:ext uri="{AF507438-7753-43e0-B8FC-AC1667EBCBE1}">
-              <a14:hiddenEffects xmlns="" xmlns:a14="http://schemas.microsoft.com/office/drawing/2010/main">
+              <a14:hiddenEffects xmlns:a14="http://schemas.microsoft.com/office/drawing/2010/main" xmlns="">
                 <a:effectLst>
                   <a:outerShdw blurRad="63500" dist="38099" dir="2700000" algn="ctr" rotWithShape="0">
                     <a:schemeClr val="bg2">
@@ -27599,14 +27599,14 @@
           <a:effectLst/>
           <a:extLst>
             <a:ext uri="{909E8E84-426E-40dd-AFC4-6F175D3DCCD1}">
-              <a14:hiddenFill xmlns="" xmlns:a14="http://schemas.microsoft.com/office/drawing/2010/main">
+              <a14:hiddenFill xmlns:a14="http://schemas.microsoft.com/office/drawing/2010/main" xmlns="">
                 <a:solidFill>
                   <a:schemeClr val="accent1"/>
                 </a:solidFill>
               </a14:hiddenFill>
             </a:ext>
             <a:ext uri="{91240B29-F687-4f45-9708-019B960494DF}">
-              <a14:hiddenLine xmlns="" xmlns:a14="http://schemas.microsoft.com/office/drawing/2010/main" w="9525">
+              <a14:hiddenLine xmlns:a14="http://schemas.microsoft.com/office/drawing/2010/main" xmlns="" w="9525">
                 <a:solidFill>
                   <a:schemeClr val="tx1"/>
                 </a:solidFill>
@@ -27616,7 +27616,7 @@
               </a14:hiddenLine>
             </a:ext>
             <a:ext uri="{AF507438-7753-43e0-B8FC-AC1667EBCBE1}">
-              <a14:hiddenEffects xmlns="" xmlns:a14="http://schemas.microsoft.com/office/drawing/2010/main">
+              <a14:hiddenEffects xmlns:a14="http://schemas.microsoft.com/office/drawing/2010/main" xmlns="">
                 <a:effectLst>
                   <a:outerShdw blurRad="63500" dist="38099" dir="2700000" algn="ctr" rotWithShape="0">
                     <a:schemeClr val="bg2">
@@ -27708,14 +27708,14 @@
           <a:effectLst/>
           <a:extLst>
             <a:ext uri="{909E8E84-426E-40dd-AFC4-6F175D3DCCD1}">
-              <a14:hiddenFill xmlns="" xmlns:a14="http://schemas.microsoft.com/office/drawing/2010/main">
+              <a14:hiddenFill xmlns:a14="http://schemas.microsoft.com/office/drawing/2010/main" xmlns="">
                 <a:solidFill>
                   <a:schemeClr val="accent1"/>
                 </a:solidFill>
               </a14:hiddenFill>
             </a:ext>
             <a:ext uri="{AF507438-7753-43e0-B8FC-AC1667EBCBE1}">
-              <a14:hiddenEffects xmlns="" xmlns:a14="http://schemas.microsoft.com/office/drawing/2010/main">
+              <a14:hiddenEffects xmlns:a14="http://schemas.microsoft.com/office/drawing/2010/main" xmlns="">
                 <a:effectLst>
                   <a:outerShdw blurRad="63500" dist="38099" dir="2700000" algn="ctr" rotWithShape="0">
                     <a:schemeClr val="bg2">
@@ -27763,14 +27763,14 @@
           <a:effectLst/>
           <a:extLst>
             <a:ext uri="{909E8E84-426E-40dd-AFC4-6F175D3DCCD1}">
-              <a14:hiddenFill xmlns="" xmlns:a14="http://schemas.microsoft.com/office/drawing/2010/main">
+              <a14:hiddenFill xmlns:a14="http://schemas.microsoft.com/office/drawing/2010/main" xmlns="">
                 <a:solidFill>
                   <a:schemeClr val="accent1"/>
                 </a:solidFill>
               </a14:hiddenFill>
             </a:ext>
             <a:ext uri="{AF507438-7753-43e0-B8FC-AC1667EBCBE1}">
-              <a14:hiddenEffects xmlns="" xmlns:a14="http://schemas.microsoft.com/office/drawing/2010/main">
+              <a14:hiddenEffects xmlns:a14="http://schemas.microsoft.com/office/drawing/2010/main" xmlns="">
                 <a:effectLst>
                   <a:outerShdw blurRad="63500" dist="38099" dir="2700000" algn="ctr" rotWithShape="0">
                     <a:schemeClr val="bg2">
@@ -27818,14 +27818,14 @@
           <a:effectLst/>
           <a:extLst>
             <a:ext uri="{909E8E84-426E-40dd-AFC4-6F175D3DCCD1}">
-              <a14:hiddenFill xmlns="" xmlns:a14="http://schemas.microsoft.com/office/drawing/2010/main">
+              <a14:hiddenFill xmlns:a14="http://schemas.microsoft.com/office/drawing/2010/main" xmlns="">
                 <a:solidFill>
                   <a:schemeClr val="accent1"/>
                 </a:solidFill>
               </a14:hiddenFill>
             </a:ext>
             <a:ext uri="{AF507438-7753-43e0-B8FC-AC1667EBCBE1}">
-              <a14:hiddenEffects xmlns="" xmlns:a14="http://schemas.microsoft.com/office/drawing/2010/main">
+              <a14:hiddenEffects xmlns:a14="http://schemas.microsoft.com/office/drawing/2010/main" xmlns="">
                 <a:effectLst>
                   <a:outerShdw blurRad="63500" dist="38099" dir="2700000" algn="ctr" rotWithShape="0">
                     <a:schemeClr val="bg2">
@@ -27965,14 +27965,14 @@
           <a:effectLst/>
           <a:extLst>
             <a:ext uri="{909E8E84-426E-40dd-AFC4-6F175D3DCCD1}">
-              <a14:hiddenFill xmlns="" xmlns:a14="http://schemas.microsoft.com/office/drawing/2010/main">
+              <a14:hiddenFill xmlns:a14="http://schemas.microsoft.com/office/drawing/2010/main" xmlns="">
                 <a:solidFill>
                   <a:schemeClr val="accent1"/>
                 </a:solidFill>
               </a14:hiddenFill>
             </a:ext>
             <a:ext uri="{91240B29-F687-4f45-9708-019B960494DF}">
-              <a14:hiddenLine xmlns="" xmlns:a14="http://schemas.microsoft.com/office/drawing/2010/main" w="9525">
+              <a14:hiddenLine xmlns:a14="http://schemas.microsoft.com/office/drawing/2010/main" xmlns="" w="9525">
                 <a:solidFill>
                   <a:schemeClr val="tx1"/>
                 </a:solidFill>
@@ -27982,7 +27982,7 @@
               </a14:hiddenLine>
             </a:ext>
             <a:ext uri="{AF507438-7753-43e0-B8FC-AC1667EBCBE1}">
-              <a14:hiddenEffects xmlns="" xmlns:a14="http://schemas.microsoft.com/office/drawing/2010/main">
+              <a14:hiddenEffects xmlns:a14="http://schemas.microsoft.com/office/drawing/2010/main" xmlns="">
                 <a:effectLst>
                   <a:outerShdw blurRad="63500" dist="38099" dir="2700000" algn="ctr" rotWithShape="0">
                     <a:schemeClr val="bg2">
@@ -28077,14 +28077,14 @@
           <a:effectLst/>
           <a:extLst>
             <a:ext uri="{909E8E84-426E-40dd-AFC4-6F175D3DCCD1}">
-              <a14:hiddenFill xmlns="" xmlns:a14="http://schemas.microsoft.com/office/drawing/2010/main">
+              <a14:hiddenFill xmlns:a14="http://schemas.microsoft.com/office/drawing/2010/main" xmlns="">
                 <a:solidFill>
                   <a:schemeClr val="accent1"/>
                 </a:solidFill>
               </a14:hiddenFill>
             </a:ext>
             <a:ext uri="{91240B29-F687-4f45-9708-019B960494DF}">
-              <a14:hiddenLine xmlns="" xmlns:a14="http://schemas.microsoft.com/office/drawing/2010/main" w="9525">
+              <a14:hiddenLine xmlns:a14="http://schemas.microsoft.com/office/drawing/2010/main" xmlns="" w="9525">
                 <a:solidFill>
                   <a:schemeClr val="tx1"/>
                 </a:solidFill>
@@ -28094,7 +28094,7 @@
               </a14:hiddenLine>
             </a:ext>
             <a:ext uri="{AF507438-7753-43e0-B8FC-AC1667EBCBE1}">
-              <a14:hiddenEffects xmlns="" xmlns:a14="http://schemas.microsoft.com/office/drawing/2010/main">
+              <a14:hiddenEffects xmlns:a14="http://schemas.microsoft.com/office/drawing/2010/main" xmlns="">
                 <a:effectLst>
                   <a:outerShdw blurRad="63500" dist="38099" dir="2700000" algn="ctr" rotWithShape="0">
                     <a:schemeClr val="bg2">
@@ -28181,14 +28181,14 @@
           <a:effectLst/>
           <a:extLst>
             <a:ext uri="{909E8E84-426E-40dd-AFC4-6F175D3DCCD1}">
-              <a14:hiddenFill xmlns="" xmlns:a14="http://schemas.microsoft.com/office/drawing/2010/main">
+              <a14:hiddenFill xmlns:a14="http://schemas.microsoft.com/office/drawing/2010/main" xmlns="">
                 <a:solidFill>
                   <a:schemeClr val="accent1"/>
                 </a:solidFill>
               </a14:hiddenFill>
             </a:ext>
             <a:ext uri="{91240B29-F687-4f45-9708-019B960494DF}">
-              <a14:hiddenLine xmlns="" xmlns:a14="http://schemas.microsoft.com/office/drawing/2010/main" w="9525">
+              <a14:hiddenLine xmlns:a14="http://schemas.microsoft.com/office/drawing/2010/main" xmlns="" w="9525">
                 <a:solidFill>
                   <a:schemeClr val="tx1"/>
                 </a:solidFill>
@@ -28198,7 +28198,7 @@
               </a14:hiddenLine>
             </a:ext>
             <a:ext uri="{AF507438-7753-43e0-B8FC-AC1667EBCBE1}">
-              <a14:hiddenEffects xmlns="" xmlns:a14="http://schemas.microsoft.com/office/drawing/2010/main">
+              <a14:hiddenEffects xmlns:a14="http://schemas.microsoft.com/office/drawing/2010/main" xmlns="">
                 <a:effectLst>
                   <a:outerShdw blurRad="63500" dist="38099" dir="2700000" algn="ctr" rotWithShape="0">
                     <a:schemeClr val="bg2">
@@ -28290,14 +28290,14 @@
           <a:effectLst/>
           <a:extLst>
             <a:ext uri="{909E8E84-426E-40dd-AFC4-6F175D3DCCD1}">
-              <a14:hiddenFill xmlns="" xmlns:a14="http://schemas.microsoft.com/office/drawing/2010/main">
+              <a14:hiddenFill xmlns:a14="http://schemas.microsoft.com/office/drawing/2010/main" xmlns="">
                 <a:solidFill>
                   <a:schemeClr val="accent1"/>
                 </a:solidFill>
               </a14:hiddenFill>
             </a:ext>
             <a:ext uri="{AF507438-7753-43e0-B8FC-AC1667EBCBE1}">
-              <a14:hiddenEffects xmlns="" xmlns:a14="http://schemas.microsoft.com/office/drawing/2010/main">
+              <a14:hiddenEffects xmlns:a14="http://schemas.microsoft.com/office/drawing/2010/main" xmlns="">
                 <a:effectLst>
                   <a:outerShdw blurRad="63500" dist="38099" dir="2700000" algn="ctr" rotWithShape="0">
                     <a:schemeClr val="bg2">
@@ -28345,14 +28345,14 @@
           <a:effectLst/>
           <a:extLst>
             <a:ext uri="{909E8E84-426E-40dd-AFC4-6F175D3DCCD1}">
-              <a14:hiddenFill xmlns="" xmlns:a14="http://schemas.microsoft.com/office/drawing/2010/main">
+              <a14:hiddenFill xmlns:a14="http://schemas.microsoft.com/office/drawing/2010/main" xmlns="">
                 <a:solidFill>
                   <a:schemeClr val="accent1"/>
                 </a:solidFill>
               </a14:hiddenFill>
             </a:ext>
             <a:ext uri="{AF507438-7753-43e0-B8FC-AC1667EBCBE1}">
-              <a14:hiddenEffects xmlns="" xmlns:a14="http://schemas.microsoft.com/office/drawing/2010/main">
+              <a14:hiddenEffects xmlns:a14="http://schemas.microsoft.com/office/drawing/2010/main" xmlns="">
                 <a:effectLst>
                   <a:outerShdw blurRad="63500" dist="38099" dir="2700000" algn="ctr" rotWithShape="0">
                     <a:schemeClr val="bg2">
@@ -28400,14 +28400,14 @@
           <a:effectLst/>
           <a:extLst>
             <a:ext uri="{909E8E84-426E-40dd-AFC4-6F175D3DCCD1}">
-              <a14:hiddenFill xmlns="" xmlns:a14="http://schemas.microsoft.com/office/drawing/2010/main">
+              <a14:hiddenFill xmlns:a14="http://schemas.microsoft.com/office/drawing/2010/main" xmlns="">
                 <a:solidFill>
                   <a:schemeClr val="accent1"/>
                 </a:solidFill>
               </a14:hiddenFill>
             </a:ext>
             <a:ext uri="{AF507438-7753-43e0-B8FC-AC1667EBCBE1}">
-              <a14:hiddenEffects xmlns="" xmlns:a14="http://schemas.microsoft.com/office/drawing/2010/main">
+              <a14:hiddenEffects xmlns:a14="http://schemas.microsoft.com/office/drawing/2010/main" xmlns="">
                 <a:effectLst>
                   <a:outerShdw blurRad="63500" dist="38099" dir="2700000" algn="ctr" rotWithShape="0">
                     <a:schemeClr val="bg2">
@@ -28471,14 +28471,14 @@
             <a:effectLst/>
             <a:extLst>
               <a:ext uri="{909E8E84-426E-40dd-AFC4-6F175D3DCCD1}">
-                <a14:hiddenFill xmlns="" xmlns:a14="http://schemas.microsoft.com/office/drawing/2010/main">
+                <a14:hiddenFill xmlns:a14="http://schemas.microsoft.com/office/drawing/2010/main" xmlns="">
                   <a:solidFill>
                     <a:schemeClr val="accent1"/>
                   </a:solidFill>
                 </a14:hiddenFill>
               </a:ext>
               <a:ext uri="{AF507438-7753-43e0-B8FC-AC1667EBCBE1}">
-                <a14:hiddenEffects xmlns="" xmlns:a14="http://schemas.microsoft.com/office/drawing/2010/main">
+                <a14:hiddenEffects xmlns:a14="http://schemas.microsoft.com/office/drawing/2010/main" xmlns="">
                   <a:effectLst>
                     <a:outerShdw blurRad="63500" dist="38099" dir="2700000" algn="ctr" rotWithShape="0">
                       <a:schemeClr val="bg2">
@@ -28526,14 +28526,14 @@
             <a:effectLst/>
             <a:extLst>
               <a:ext uri="{909E8E84-426E-40dd-AFC4-6F175D3DCCD1}">
-                <a14:hiddenFill xmlns="" xmlns:a14="http://schemas.microsoft.com/office/drawing/2010/main">
+                <a14:hiddenFill xmlns:a14="http://schemas.microsoft.com/office/drawing/2010/main" xmlns="">
                   <a:solidFill>
                     <a:schemeClr val="accent1"/>
                   </a:solidFill>
                 </a14:hiddenFill>
               </a:ext>
               <a:ext uri="{AF507438-7753-43e0-B8FC-AC1667EBCBE1}">
-                <a14:hiddenEffects xmlns="" xmlns:a14="http://schemas.microsoft.com/office/drawing/2010/main">
+                <a14:hiddenEffects xmlns:a14="http://schemas.microsoft.com/office/drawing/2010/main" xmlns="">
                   <a:effectLst>
                     <a:outerShdw blurRad="63500" dist="38099" dir="2700000" algn="ctr" rotWithShape="0">
                       <a:schemeClr val="bg2">
@@ -28581,14 +28581,14 @@
             <a:effectLst/>
             <a:extLst>
               <a:ext uri="{909E8E84-426E-40dd-AFC4-6F175D3DCCD1}">
-                <a14:hiddenFill xmlns="" xmlns:a14="http://schemas.microsoft.com/office/drawing/2010/main">
+                <a14:hiddenFill xmlns:a14="http://schemas.microsoft.com/office/drawing/2010/main" xmlns="">
                   <a:solidFill>
                     <a:schemeClr val="accent1"/>
                   </a:solidFill>
                 </a14:hiddenFill>
               </a:ext>
               <a:ext uri="{AF507438-7753-43e0-B8FC-AC1667EBCBE1}">
-                <a14:hiddenEffects xmlns="" xmlns:a14="http://schemas.microsoft.com/office/drawing/2010/main">
+                <a14:hiddenEffects xmlns:a14="http://schemas.microsoft.com/office/drawing/2010/main" xmlns="">
                   <a:effectLst>
                     <a:outerShdw blurRad="63500" dist="38099" dir="2700000" algn="ctr" rotWithShape="0">
                       <a:schemeClr val="bg2">
@@ -28636,14 +28636,14 @@
             <a:effectLst/>
             <a:extLst>
               <a:ext uri="{909E8E84-426E-40dd-AFC4-6F175D3DCCD1}">
-                <a14:hiddenFill xmlns="" xmlns:a14="http://schemas.microsoft.com/office/drawing/2010/main">
+                <a14:hiddenFill xmlns:a14="http://schemas.microsoft.com/office/drawing/2010/main" xmlns="">
                   <a:solidFill>
                     <a:schemeClr val="accent1"/>
                   </a:solidFill>
                 </a14:hiddenFill>
               </a:ext>
               <a:ext uri="{AF507438-7753-43e0-B8FC-AC1667EBCBE1}">
-                <a14:hiddenEffects xmlns="" xmlns:a14="http://schemas.microsoft.com/office/drawing/2010/main">
+                <a14:hiddenEffects xmlns:a14="http://schemas.microsoft.com/office/drawing/2010/main" xmlns="">
                   <a:effectLst>
                     <a:outerShdw blurRad="63500" dist="38099" dir="2700000" algn="ctr" rotWithShape="0">
                       <a:schemeClr val="bg2">
@@ -28692,14 +28692,14 @@
           <a:effectLst/>
           <a:extLst>
             <a:ext uri="{909E8E84-426E-40dd-AFC4-6F175D3DCCD1}">
-              <a14:hiddenFill xmlns="" xmlns:a14="http://schemas.microsoft.com/office/drawing/2010/main">
+              <a14:hiddenFill xmlns:a14="http://schemas.microsoft.com/office/drawing/2010/main" xmlns="">
                 <a:solidFill>
                   <a:schemeClr val="accent1"/>
                 </a:solidFill>
               </a14:hiddenFill>
             </a:ext>
             <a:ext uri="{AF507438-7753-43e0-B8FC-AC1667EBCBE1}">
-              <a14:hiddenEffects xmlns="" xmlns:a14="http://schemas.microsoft.com/office/drawing/2010/main">
+              <a14:hiddenEffects xmlns:a14="http://schemas.microsoft.com/office/drawing/2010/main" xmlns="">
                 <a:effectLst>
                   <a:outerShdw blurRad="63500" dist="38099" dir="2700000" algn="ctr" rotWithShape="0">
                     <a:schemeClr val="bg2">
@@ -28747,14 +28747,14 @@
           <a:effectLst/>
           <a:extLst>
             <a:ext uri="{909E8E84-426E-40dd-AFC4-6F175D3DCCD1}">
-              <a14:hiddenFill xmlns="" xmlns:a14="http://schemas.microsoft.com/office/drawing/2010/main">
+              <a14:hiddenFill xmlns:a14="http://schemas.microsoft.com/office/drawing/2010/main" xmlns="">
                 <a:solidFill>
                   <a:schemeClr val="accent1"/>
                 </a:solidFill>
               </a14:hiddenFill>
             </a:ext>
             <a:ext uri="{AF507438-7753-43e0-B8FC-AC1667EBCBE1}">
-              <a14:hiddenEffects xmlns="" xmlns:a14="http://schemas.microsoft.com/office/drawing/2010/main">
+              <a14:hiddenEffects xmlns:a14="http://schemas.microsoft.com/office/drawing/2010/main" xmlns="">
                 <a:effectLst>
                   <a:outerShdw blurRad="63500" dist="38099" dir="2700000" algn="ctr" rotWithShape="0">
                     <a:schemeClr val="bg2">
@@ -28802,14 +28802,14 @@
           <a:effectLst/>
           <a:extLst>
             <a:ext uri="{909E8E84-426E-40dd-AFC4-6F175D3DCCD1}">
-              <a14:hiddenFill xmlns="" xmlns:a14="http://schemas.microsoft.com/office/drawing/2010/main">
+              <a14:hiddenFill xmlns:a14="http://schemas.microsoft.com/office/drawing/2010/main" xmlns="">
                 <a:solidFill>
                   <a:schemeClr val="accent1"/>
                 </a:solidFill>
               </a14:hiddenFill>
             </a:ext>
             <a:ext uri="{AF507438-7753-43e0-B8FC-AC1667EBCBE1}">
-              <a14:hiddenEffects xmlns="" xmlns:a14="http://schemas.microsoft.com/office/drawing/2010/main">
+              <a14:hiddenEffects xmlns:a14="http://schemas.microsoft.com/office/drawing/2010/main" xmlns="">
                 <a:effectLst>
                   <a:outerShdw blurRad="63500" dist="38099" dir="2700000" algn="ctr" rotWithShape="0">
                     <a:schemeClr val="bg2">
@@ -28857,14 +28857,14 @@
           <a:effectLst/>
           <a:extLst>
             <a:ext uri="{909E8E84-426E-40dd-AFC4-6F175D3DCCD1}">
-              <a14:hiddenFill xmlns="" xmlns:a14="http://schemas.microsoft.com/office/drawing/2010/main">
+              <a14:hiddenFill xmlns:a14="http://schemas.microsoft.com/office/drawing/2010/main" xmlns="">
                 <a:solidFill>
                   <a:schemeClr val="accent1"/>
                 </a:solidFill>
               </a14:hiddenFill>
             </a:ext>
             <a:ext uri="{AF507438-7753-43e0-B8FC-AC1667EBCBE1}">
-              <a14:hiddenEffects xmlns="" xmlns:a14="http://schemas.microsoft.com/office/drawing/2010/main">
+              <a14:hiddenEffects xmlns:a14="http://schemas.microsoft.com/office/drawing/2010/main" xmlns="">
                 <a:effectLst>
                   <a:outerShdw blurRad="63500" dist="38099" dir="2700000" algn="ctr" rotWithShape="0">
                     <a:schemeClr val="bg2">
@@ -28912,14 +28912,14 @@
           <a:effectLst/>
           <a:extLst>
             <a:ext uri="{909E8E84-426E-40dd-AFC4-6F175D3DCCD1}">
-              <a14:hiddenFill xmlns="" xmlns:a14="http://schemas.microsoft.com/office/drawing/2010/main">
+              <a14:hiddenFill xmlns:a14="http://schemas.microsoft.com/office/drawing/2010/main" xmlns="">
                 <a:solidFill>
                   <a:schemeClr val="accent1"/>
                 </a:solidFill>
               </a14:hiddenFill>
             </a:ext>
             <a:ext uri="{AF507438-7753-43e0-B8FC-AC1667EBCBE1}">
-              <a14:hiddenEffects xmlns="" xmlns:a14="http://schemas.microsoft.com/office/drawing/2010/main">
+              <a14:hiddenEffects xmlns:a14="http://schemas.microsoft.com/office/drawing/2010/main" xmlns="">
                 <a:effectLst>
                   <a:outerShdw blurRad="63500" dist="38099" dir="2700000" algn="ctr" rotWithShape="0">
                     <a:schemeClr val="bg2">
@@ -28967,14 +28967,14 @@
           <a:effectLst/>
           <a:extLst>
             <a:ext uri="{909E8E84-426E-40dd-AFC4-6F175D3DCCD1}">
-              <a14:hiddenFill xmlns="" xmlns:a14="http://schemas.microsoft.com/office/drawing/2010/main">
+              <a14:hiddenFill xmlns:a14="http://schemas.microsoft.com/office/drawing/2010/main" xmlns="">
                 <a:solidFill>
                   <a:schemeClr val="accent1"/>
                 </a:solidFill>
               </a14:hiddenFill>
             </a:ext>
             <a:ext uri="{AF507438-7753-43e0-B8FC-AC1667EBCBE1}">
-              <a14:hiddenEffects xmlns="" xmlns:a14="http://schemas.microsoft.com/office/drawing/2010/main">
+              <a14:hiddenEffects xmlns:a14="http://schemas.microsoft.com/office/drawing/2010/main" xmlns="">
                 <a:effectLst>
                   <a:outerShdw blurRad="63500" dist="38099" dir="2700000" algn="ctr" rotWithShape="0">
                     <a:schemeClr val="bg2">
@@ -29022,14 +29022,14 @@
           <a:effectLst/>
           <a:extLst>
             <a:ext uri="{909E8E84-426E-40dd-AFC4-6F175D3DCCD1}">
-              <a14:hiddenFill xmlns="" xmlns:a14="http://schemas.microsoft.com/office/drawing/2010/main">
+              <a14:hiddenFill xmlns:a14="http://schemas.microsoft.com/office/drawing/2010/main" xmlns="">
                 <a:solidFill>
                   <a:schemeClr val="accent1"/>
                 </a:solidFill>
               </a14:hiddenFill>
             </a:ext>
             <a:ext uri="{AF507438-7753-43e0-B8FC-AC1667EBCBE1}">
-              <a14:hiddenEffects xmlns="" xmlns:a14="http://schemas.microsoft.com/office/drawing/2010/main">
+              <a14:hiddenEffects xmlns:a14="http://schemas.microsoft.com/office/drawing/2010/main" xmlns="">
                 <a:effectLst>
                   <a:outerShdw blurRad="63500" dist="38099" dir="2700000" algn="ctr" rotWithShape="0">
                     <a:schemeClr val="bg2">
@@ -29077,14 +29077,14 @@
           <a:effectLst/>
           <a:extLst>
             <a:ext uri="{909E8E84-426E-40dd-AFC4-6F175D3DCCD1}">
-              <a14:hiddenFill xmlns="" xmlns:a14="http://schemas.microsoft.com/office/drawing/2010/main">
+              <a14:hiddenFill xmlns:a14="http://schemas.microsoft.com/office/drawing/2010/main" xmlns="">
                 <a:solidFill>
                   <a:schemeClr val="accent1"/>
                 </a:solidFill>
               </a14:hiddenFill>
             </a:ext>
             <a:ext uri="{AF507438-7753-43e0-B8FC-AC1667EBCBE1}">
-              <a14:hiddenEffects xmlns="" xmlns:a14="http://schemas.microsoft.com/office/drawing/2010/main">
+              <a14:hiddenEffects xmlns:a14="http://schemas.microsoft.com/office/drawing/2010/main" xmlns="">
                 <a:effectLst>
                   <a:outerShdw blurRad="63500" dist="38099" dir="2700000" algn="ctr" rotWithShape="0">
                     <a:schemeClr val="bg2">
@@ -29127,14 +29127,14 @@
           <a:effectLst/>
           <a:extLst>
             <a:ext uri="{909E8E84-426E-40dd-AFC4-6F175D3DCCD1}">
-              <a14:hiddenFill xmlns="" xmlns:a14="http://schemas.microsoft.com/office/drawing/2010/main">
+              <a14:hiddenFill xmlns:a14="http://schemas.microsoft.com/office/drawing/2010/main" xmlns="">
                 <a:solidFill>
                   <a:schemeClr val="accent1"/>
                 </a:solidFill>
               </a14:hiddenFill>
             </a:ext>
             <a:ext uri="{91240B29-F687-4f45-9708-019B960494DF}">
-              <a14:hiddenLine xmlns="" xmlns:a14="http://schemas.microsoft.com/office/drawing/2010/main" w="28575">
+              <a14:hiddenLine xmlns:a14="http://schemas.microsoft.com/office/drawing/2010/main" xmlns="" w="28575">
                 <a:solidFill>
                   <a:srgbClr val="FF6600"/>
                 </a:solidFill>
@@ -29144,7 +29144,7 @@
               </a14:hiddenLine>
             </a:ext>
             <a:ext uri="{AF507438-7753-43e0-B8FC-AC1667EBCBE1}">
-              <a14:hiddenEffects xmlns="" xmlns:a14="http://schemas.microsoft.com/office/drawing/2010/main">
+              <a14:hiddenEffects xmlns:a14="http://schemas.microsoft.com/office/drawing/2010/main" xmlns="">
                 <a:effectLst>
                   <a:outerShdw blurRad="63500" dist="38099" dir="2700000" algn="ctr" rotWithShape="0">
                     <a:schemeClr val="bg2">
@@ -29198,14 +29198,14 @@
           <a:effectLst/>
           <a:extLst>
             <a:ext uri="{909E8E84-426E-40dd-AFC4-6F175D3DCCD1}">
-              <a14:hiddenFill xmlns="" xmlns:a14="http://schemas.microsoft.com/office/drawing/2010/main">
+              <a14:hiddenFill xmlns:a14="http://schemas.microsoft.com/office/drawing/2010/main" xmlns="">
                 <a:solidFill>
                   <a:schemeClr val="accent1"/>
                 </a:solidFill>
               </a14:hiddenFill>
             </a:ext>
             <a:ext uri="{91240B29-F687-4f45-9708-019B960494DF}">
-              <a14:hiddenLine xmlns="" xmlns:a14="http://schemas.microsoft.com/office/drawing/2010/main" w="28575">
+              <a14:hiddenLine xmlns:a14="http://schemas.microsoft.com/office/drawing/2010/main" xmlns="" w="28575">
                 <a:solidFill>
                   <a:srgbClr val="FF6600"/>
                 </a:solidFill>
@@ -29215,7 +29215,7 @@
               </a14:hiddenLine>
             </a:ext>
             <a:ext uri="{AF507438-7753-43e0-B8FC-AC1667EBCBE1}">
-              <a14:hiddenEffects xmlns="" xmlns:a14="http://schemas.microsoft.com/office/drawing/2010/main">
+              <a14:hiddenEffects xmlns:a14="http://schemas.microsoft.com/office/drawing/2010/main" xmlns="">
                 <a:effectLst>
                   <a:outerShdw blurRad="63500" dist="38099" dir="2700000" algn="ctr" rotWithShape="0">
                     <a:schemeClr val="bg2">
@@ -29269,14 +29269,14 @@
           <a:effectLst/>
           <a:extLst>
             <a:ext uri="{909E8E84-426E-40dd-AFC4-6F175D3DCCD1}">
-              <a14:hiddenFill xmlns="" xmlns:a14="http://schemas.microsoft.com/office/drawing/2010/main">
+              <a14:hiddenFill xmlns:a14="http://schemas.microsoft.com/office/drawing/2010/main" xmlns="">
                 <a:solidFill>
                   <a:schemeClr val="accent1"/>
                 </a:solidFill>
               </a14:hiddenFill>
             </a:ext>
             <a:ext uri="{91240B29-F687-4f45-9708-019B960494DF}">
-              <a14:hiddenLine xmlns="" xmlns:a14="http://schemas.microsoft.com/office/drawing/2010/main" w="28575">
+              <a14:hiddenLine xmlns:a14="http://schemas.microsoft.com/office/drawing/2010/main" xmlns="" w="28575">
                 <a:solidFill>
                   <a:srgbClr val="FF6600"/>
                 </a:solidFill>
@@ -29286,7 +29286,7 @@
               </a14:hiddenLine>
             </a:ext>
             <a:ext uri="{AF507438-7753-43e0-B8FC-AC1667EBCBE1}">
-              <a14:hiddenEffects xmlns="" xmlns:a14="http://schemas.microsoft.com/office/drawing/2010/main">
+              <a14:hiddenEffects xmlns:a14="http://schemas.microsoft.com/office/drawing/2010/main" xmlns="">
                 <a:effectLst>
                   <a:outerShdw blurRad="63500" dist="38099" dir="2700000" algn="ctr" rotWithShape="0">
                     <a:schemeClr val="bg2">
@@ -29340,14 +29340,14 @@
           <a:effectLst/>
           <a:extLst>
             <a:ext uri="{909E8E84-426E-40dd-AFC4-6F175D3DCCD1}">
-              <a14:hiddenFill xmlns="" xmlns:a14="http://schemas.microsoft.com/office/drawing/2010/main">
+              <a14:hiddenFill xmlns:a14="http://schemas.microsoft.com/office/drawing/2010/main" xmlns="">
                 <a:solidFill>
                   <a:schemeClr val="accent1"/>
                 </a:solidFill>
               </a14:hiddenFill>
             </a:ext>
             <a:ext uri="{91240B29-F687-4f45-9708-019B960494DF}">
-              <a14:hiddenLine xmlns="" xmlns:a14="http://schemas.microsoft.com/office/drawing/2010/main" w="28575">
+              <a14:hiddenLine xmlns:a14="http://schemas.microsoft.com/office/drawing/2010/main" xmlns="" w="28575">
                 <a:solidFill>
                   <a:srgbClr val="FF6600"/>
                 </a:solidFill>
@@ -29357,7 +29357,7 @@
               </a14:hiddenLine>
             </a:ext>
             <a:ext uri="{AF507438-7753-43e0-B8FC-AC1667EBCBE1}">
-              <a14:hiddenEffects xmlns="" xmlns:a14="http://schemas.microsoft.com/office/drawing/2010/main">
+              <a14:hiddenEffects xmlns:a14="http://schemas.microsoft.com/office/drawing/2010/main" xmlns="">
                 <a:effectLst>
                   <a:outerShdw blurRad="63500" dist="38099" dir="2700000" algn="ctr" rotWithShape="0">
                     <a:schemeClr val="bg2">
@@ -39306,7 +39306,7 @@
           <a:noFill/>
           <a:extLst>
             <a:ext uri="{909E8E84-426E-40dd-AFC4-6F175D3DCCD1}">
-              <a14:hiddenFill xmlns="" xmlns:a14="http://schemas.microsoft.com/office/drawing/2010/main">
+              <a14:hiddenFill xmlns:a14="http://schemas.microsoft.com/office/drawing/2010/main" xmlns="">
                 <a:solidFill>
                   <a:srgbClr val="FFFFFF"/>
                 </a:solidFill>

</xml_diff>